<commit_message>
Add new de cuong
</commit_message>
<xml_diff>
--- a/task/28-09-2020/DeCuong(Update).pptx
+++ b/task/28-09-2020/DeCuong(Update).pptx
@@ -17626,7 +17626,7 @@
         <p:fade/>
       </p:transition>
     </mc:Choice>
-    <mc:Fallback xmlns:p15="http://schemas.microsoft.com/office/powerpoint/2012/main" xmlns="">
+    <mc:Fallback xmlns="" xmlns:p15="http://schemas.microsoft.com/office/powerpoint/2012/main">
       <p:transition spd="med">
         <p:fade/>
       </p:transition>
@@ -18823,7 +18823,7 @@
         <p:fade/>
       </p:transition>
     </mc:Choice>
-    <mc:Fallback xmlns:p15="http://schemas.microsoft.com/office/powerpoint/2012/main" xmlns="">
+    <mc:Fallback xmlns="" xmlns:p15="http://schemas.microsoft.com/office/powerpoint/2012/main">
       <p:transition spd="med">
         <p:fade/>
       </p:transition>
@@ -18898,16 +18898,7 @@
                 </a:solidFill>
                 <a:latin typeface="Times New Roman"/>
               </a:rPr>
-              <a:t>Hệ thống nhận dạng giọng </a:t>
-            </a:r>
-            <a:r>
-              <a:rPr lang="en-US" sz="2400" spc="-1" noProof="1" smtClean="0">
-                <a:solidFill>
-                  <a:srgbClr val="002060"/>
-                </a:solidFill>
-                <a:latin typeface="Times New Roman"/>
-              </a:rPr>
-              <a:t>nói sử dụng kiến trúc mô hình nhận dạng đầu cuối (end-to-end).</a:t>
+              <a:t>Hệ thống nhận dạng giọng nói sử dụng kiến trúc mô hình nhận dạng đầu cuối (end-to-end).</a:t>
             </a:r>
             <a:endParaRPr lang="en-US" sz="2400" spc="-1" dirty="0">
               <a:solidFill>
@@ -19688,7 +19679,88 @@
                 </a:solidFill>
                 <a:latin typeface="Times New Roman"/>
               </a:rPr>
-              <a:t>câu, nhưng chưa hoàn chỉnh vì có các ký tự lặp lại như "heelllo", </a:t>
+              <a:t>câu, nhưng chưa hoàn chỉnh vì có các ký tự lặp lại như "heelllo", "</a:t>
+            </a:r>
+            <a:r>
+              <a:rPr lang="vi-VN" sz="2400" spc="-1" noProof="1" smtClean="0">
+                <a:solidFill>
+                  <a:srgbClr val="002060"/>
+                </a:solidFill>
+                <a:latin typeface="Times New Roman"/>
+              </a:rPr>
+              <a:t>toooo</a:t>
+            </a:r>
+            <a:r>
+              <a:rPr lang="en-US" sz="2400" spc="-1" noProof="1" smtClean="0">
+                <a:solidFill>
+                  <a:srgbClr val="002060"/>
+                </a:solidFill>
+                <a:latin typeface="Times New Roman"/>
+              </a:rPr>
+              <a:t>” do </a:t>
+            </a:r>
+            <a:r>
+              <a:rPr lang="vi-VN" sz="2400" spc="-1" noProof="1" smtClean="0">
+                <a:solidFill>
+                  <a:srgbClr val="002060"/>
+                </a:solidFill>
+                <a:latin typeface="Times New Roman"/>
+              </a:rPr>
+              <a:t>giọng nói dài</a:t>
+            </a:r>
+            <a:r>
+              <a:rPr lang="en-US" sz="2400" spc="-1" noProof="1" smtClean="0">
+                <a:solidFill>
+                  <a:srgbClr val="002060"/>
+                </a:solidFill>
+                <a:latin typeface="Times New Roman"/>
+              </a:rPr>
+              <a:t>, </a:t>
+            </a:r>
+            <a:r>
+              <a:rPr lang="vi-VN" sz="2400" spc="-1" noProof="1" smtClean="0">
+                <a:solidFill>
+                  <a:srgbClr val="002060"/>
+                </a:solidFill>
+                <a:latin typeface="Times New Roman"/>
+              </a:rPr>
+              <a:t>giọng bị ngắt quãng</a:t>
+            </a:r>
+            <a:r>
+              <a:rPr lang="en-US" sz="2400" spc="-1" noProof="1" smtClean="0">
+                <a:solidFill>
+                  <a:srgbClr val="002060"/>
+                </a:solidFill>
+                <a:latin typeface="Times New Roman"/>
+              </a:rPr>
+              <a:t>. </a:t>
+            </a:r>
+            <a:r>
+              <a:rPr lang="en-US" sz="2400" spc="-1" noProof="1">
+                <a:solidFill>
+                  <a:srgbClr val="002060"/>
+                </a:solidFill>
+                <a:latin typeface="Times New Roman"/>
+              </a:rPr>
+              <a:t>CTC </a:t>
+            </a:r>
+            <a:r>
+              <a:rPr lang="en-US" sz="2400" spc="-1" noProof="1" smtClean="0">
+                <a:solidFill>
+                  <a:srgbClr val="002060"/>
+                </a:solidFill>
+                <a:latin typeface="Times New Roman"/>
+              </a:rPr>
+              <a:t> được dùng </a:t>
+            </a:r>
+            <a:r>
+              <a:rPr lang="vi-VN" sz="2400" spc="-1" noProof="1" smtClean="0">
+                <a:solidFill>
+                  <a:srgbClr val="002060"/>
+                </a:solidFill>
+                <a:latin typeface="Times New Roman"/>
+              </a:rPr>
+              <a:t>để </a:t>
             </a:r>
             <a:r>
               <a:rPr lang="vi-VN" sz="2400" spc="-1" noProof="1">
@@ -19697,7 +19769,16 @@
                 </a:solidFill>
                 <a:latin typeface="Times New Roman"/>
               </a:rPr>
-              <a:t>"</a:t>
+              <a:t>cho ra được một câu hoàn chỉnh </a:t>
+            </a:r>
+            <a:r>
+              <a:rPr lang="en-US" sz="2400" spc="-1" noProof="1" smtClean="0">
+                <a:solidFill>
+                  <a:srgbClr val="002060"/>
+                </a:solidFill>
+                <a:latin typeface="Times New Roman"/>
+              </a:rPr>
+              <a:t>bằng cách </a:t>
             </a:r>
             <a:r>
               <a:rPr lang="vi-VN" sz="2400" spc="-1" noProof="1" smtClean="0">
@@ -19706,133 +19787,16 @@
                 </a:solidFill>
                 <a:latin typeface="Times New Roman"/>
               </a:rPr>
-              <a:t>toooo</a:t>
-            </a:r>
-            <a:r>
-              <a:rPr lang="en-US" sz="2400" spc="-1" noProof="1" smtClean="0">
+              <a:t>căn </a:t>
+            </a:r>
+            <a:r>
+              <a:rPr lang="vi-VN" sz="2400" spc="-1" noProof="1">
                 <a:solidFill>
                   <a:srgbClr val="002060"/>
                 </a:solidFill>
                 <a:latin typeface="Times New Roman"/>
               </a:rPr>
-              <a:t>” do </a:t>
-            </a:r>
-            <a:r>
-              <a:rPr lang="vi-VN" sz="2400" spc="-1" noProof="1" smtClean="0">
-                <a:solidFill>
-                  <a:srgbClr val="002060"/>
-                </a:solidFill>
-                <a:latin typeface="Times New Roman"/>
-              </a:rPr>
-              <a:t>giọng nói dài</a:t>
-            </a:r>
-            <a:r>
-              <a:rPr lang="en-US" sz="2400" spc="-1" noProof="1" smtClean="0">
-                <a:solidFill>
-                  <a:srgbClr val="002060"/>
-                </a:solidFill>
-                <a:latin typeface="Times New Roman"/>
-              </a:rPr>
-              <a:t>, </a:t>
-            </a:r>
-            <a:r>
-              <a:rPr lang="vi-VN" sz="2400" spc="-1" noProof="1" smtClean="0">
-                <a:solidFill>
-                  <a:srgbClr val="002060"/>
-                </a:solidFill>
-                <a:latin typeface="Times New Roman"/>
-              </a:rPr>
-              <a:t>giọng bị ngắt quãng</a:t>
-            </a:r>
-            <a:r>
-              <a:rPr lang="en-US" sz="2400" spc="-1" noProof="1" smtClean="0">
-                <a:solidFill>
-                  <a:srgbClr val="002060"/>
-                </a:solidFill>
-                <a:latin typeface="Times New Roman"/>
-              </a:rPr>
-              <a:t>. </a:t>
-            </a:r>
-            <a:r>
-              <a:rPr lang="en-US" sz="2400" spc="-1" noProof="1">
-                <a:solidFill>
-                  <a:srgbClr val="002060"/>
-                </a:solidFill>
-                <a:latin typeface="Times New Roman"/>
-              </a:rPr>
-              <a:t>CTC </a:t>
-            </a:r>
-            <a:r>
-              <a:rPr lang="en-US" sz="2400" spc="-1" noProof="1" smtClean="0">
-                <a:solidFill>
-                  <a:srgbClr val="002060"/>
-                </a:solidFill>
-                <a:latin typeface="Times New Roman"/>
-              </a:rPr>
-              <a:t> được dùng </a:t>
-            </a:r>
-            <a:r>
-              <a:rPr lang="vi-VN" sz="2400" spc="-1" noProof="1" smtClean="0">
-                <a:solidFill>
-                  <a:srgbClr val="002060"/>
-                </a:solidFill>
-                <a:latin typeface="Times New Roman"/>
-              </a:rPr>
-              <a:t>để </a:t>
-            </a:r>
-            <a:r>
-              <a:rPr lang="vi-VN" sz="2400" spc="-1" noProof="1">
-                <a:solidFill>
-                  <a:srgbClr val="002060"/>
-                </a:solidFill>
-                <a:latin typeface="Times New Roman"/>
-              </a:rPr>
-              <a:t>cho ra được một câu hoàn </a:t>
-            </a:r>
-            <a:r>
-              <a:rPr lang="vi-VN" sz="2400" spc="-1" noProof="1">
-                <a:solidFill>
-                  <a:srgbClr val="002060"/>
-                </a:solidFill>
-                <a:latin typeface="Times New Roman"/>
-              </a:rPr>
-              <a:t>chỉnh </a:t>
-            </a:r>
-            <a:r>
-              <a:rPr lang="en-US" sz="2400" spc="-1" noProof="1" smtClean="0">
-                <a:solidFill>
-                  <a:srgbClr val="002060"/>
-                </a:solidFill>
-                <a:latin typeface="Times New Roman"/>
-              </a:rPr>
-              <a:t>bằng cách </a:t>
-            </a:r>
-            <a:r>
-              <a:rPr lang="vi-VN" sz="2400" spc="-1" noProof="1" smtClean="0">
-                <a:solidFill>
-                  <a:srgbClr val="002060"/>
-                </a:solidFill>
-                <a:latin typeface="Times New Roman"/>
-              </a:rPr>
-              <a:t>căn </a:t>
-            </a:r>
-            <a:r>
-              <a:rPr lang="vi-VN" sz="2400" spc="-1" noProof="1">
-                <a:solidFill>
-                  <a:srgbClr val="002060"/>
-                </a:solidFill>
-                <a:latin typeface="Times New Roman"/>
-              </a:rPr>
-              <a:t>chỉnh lại đầu ra ấy, loại bỏ các ký tự lặp lại và khoảng trống</a:t>
-            </a:r>
-            <a:r>
-              <a:rPr lang="vi-VN" sz="2400" spc="-1" noProof="1">
-                <a:solidFill>
-                  <a:srgbClr val="002060"/>
-                </a:solidFill>
-                <a:latin typeface="Times New Roman"/>
-              </a:rPr>
-              <a:t>. </a:t>
+              <a:t>chỉnh lại đầu ra ấy, loại bỏ các ký tự lặp lại và khoảng trống. </a:t>
             </a:r>
             <a:endParaRPr lang="en-US" sz="2400" spc="-1" dirty="0">
               <a:solidFill>
@@ -19858,7 +19822,7 @@
         <p:fade/>
       </p:transition>
     </mc:Choice>
-    <mc:Fallback xmlns:p15="http://schemas.microsoft.com/office/powerpoint/2012/main" xmlns="">
+    <mc:Fallback xmlns="" xmlns:p15="http://schemas.microsoft.com/office/powerpoint/2012/main">
       <p:transition spd="med">
         <p:fade/>
       </p:transition>
@@ -22725,7 +22689,7 @@
         <p:fade/>
       </p:transition>
     </mc:Choice>
-    <mc:Fallback xmlns:p15="http://schemas.microsoft.com/office/powerpoint/2012/main" xmlns="">
+    <mc:Fallback xmlns="" xmlns:p15="http://schemas.microsoft.com/office/powerpoint/2012/main">
       <p:transition spd="med">
         <p:fade/>
       </p:transition>
@@ -23228,17 +23192,7 @@
                           <a:latin typeface="Times New Roman" panose="02020603050405020304" pitchFamily="18" charset="0"/>
                           <a:cs typeface="Times New Roman" panose="02020603050405020304" pitchFamily="18" charset="0"/>
                         </a:rPr>
-                        <a:t> </a:t>
-                      </a:r>
-                      <a:r>
-                        <a:rPr lang="en-US" sz="2000" dirty="0">
-                          <a:solidFill>
-                            <a:srgbClr val="002060"/>
-                          </a:solidFill>
-                          <a:latin typeface="Times New Roman" panose="02020603050405020304" pitchFamily="18" charset="0"/>
-                          <a:cs typeface="Times New Roman" panose="02020603050405020304" pitchFamily="18" charset="0"/>
-                        </a:rPr>
-                        <a:t>T</a:t>
+                        <a:t> T</a:t>
                       </a:r>
                       <a:r>
                         <a:rPr lang="en-US" sz="2000" dirty="0" smtClean="0">
@@ -23864,7 +23818,7 @@
         <p:fade/>
       </p:transition>
     </mc:Choice>
-    <mc:Fallback xmlns:p15="http://schemas.microsoft.com/office/powerpoint/2012/main" xmlns="">
+    <mc:Fallback xmlns="" xmlns:p15="http://schemas.microsoft.com/office/powerpoint/2012/main">
       <p:transition spd="med">
         <p:fade/>
       </p:transition>
@@ -24210,7 +24164,7 @@
         <p:fade/>
       </p:transition>
     </mc:Choice>
-    <mc:Fallback xmlns:p15="http://schemas.microsoft.com/office/powerpoint/2012/main" xmlns="">
+    <mc:Fallback xmlns="" xmlns:p15="http://schemas.microsoft.com/office/powerpoint/2012/main">
       <p:transition spd="med">
         <p:fade/>
       </p:transition>
@@ -27740,67 +27694,47 @@
                 <a:latin typeface="Times New Roman" panose="02020603050405020304" pitchFamily="18" charset="0"/>
                 <a:cs typeface="Times New Roman" panose="02020603050405020304" pitchFamily="18" charset="0"/>
               </a:rPr>
-              <a:t>Hannun∗ , Carl Case, Jared Casper, Bryan Catanzaro, Greg Diamos, </a:t>
-            </a:r>
-            <a:r>
-              <a:rPr lang="vi-VN" sz="2400" noProof="1">
+              <a:t>Hannun∗ , Carl Case, Jared Casper, Bryan Catanzaro, Greg Diamos, Erich </a:t>
+            </a:r>
+            <a:r>
+              <a:rPr lang="vi-VN" sz="2400" noProof="1" smtClean="0">
                 <a:solidFill>
                   <a:srgbClr val="002060"/>
                 </a:solidFill>
                 <a:latin typeface="Times New Roman" panose="02020603050405020304" pitchFamily="18" charset="0"/>
                 <a:cs typeface="Times New Roman" panose="02020603050405020304" pitchFamily="18" charset="0"/>
               </a:rPr>
-              <a:t>Erich </a:t>
-            </a:r>
-            <a:r>
-              <a:rPr lang="vi-VN" sz="2400" noProof="1" smtClean="0">
+              <a:t>Elsen,</a:t>
+            </a:r>
+            <a:r>
+              <a:rPr lang="en-US" sz="2400" noProof="1" smtClean="0">
                 <a:solidFill>
                   <a:srgbClr val="002060"/>
                 </a:solidFill>
                 <a:latin typeface="Times New Roman" panose="02020603050405020304" pitchFamily="18" charset="0"/>
                 <a:cs typeface="Times New Roman" panose="02020603050405020304" pitchFamily="18" charset="0"/>
               </a:rPr>
-              <a:t>Elsen,</a:t>
-            </a:r>
-            <a:r>
-              <a:rPr lang="en-US" sz="2400" noProof="1" smtClean="0">
+              <a:t> </a:t>
+            </a:r>
+            <a:r>
+              <a:rPr lang="vi-VN" sz="2400" noProof="1" smtClean="0">
                 <a:solidFill>
                   <a:srgbClr val="002060"/>
                 </a:solidFill>
                 <a:latin typeface="Times New Roman" panose="02020603050405020304" pitchFamily="18" charset="0"/>
                 <a:cs typeface="Times New Roman" panose="02020603050405020304" pitchFamily="18" charset="0"/>
               </a:rPr>
-              <a:t> </a:t>
-            </a:r>
-            <a:r>
-              <a:rPr lang="vi-VN" sz="2400" noProof="1" smtClean="0">
+              <a:t>Ryan </a:t>
+            </a:r>
+            <a:r>
+              <a:rPr lang="vi-VN" sz="2400" noProof="1">
                 <a:solidFill>
                   <a:srgbClr val="002060"/>
                 </a:solidFill>
                 <a:latin typeface="Times New Roman" panose="02020603050405020304" pitchFamily="18" charset="0"/>
                 <a:cs typeface="Times New Roman" panose="02020603050405020304" pitchFamily="18" charset="0"/>
               </a:rPr>
-              <a:t>Ryan </a:t>
-            </a:r>
-            <a:r>
-              <a:rPr lang="vi-VN" sz="2400" noProof="1">
-                <a:solidFill>
-                  <a:srgbClr val="002060"/>
-                </a:solidFill>
-                <a:latin typeface="Times New Roman" panose="02020603050405020304" pitchFamily="18" charset="0"/>
-                <a:cs typeface="Times New Roman" panose="02020603050405020304" pitchFamily="18" charset="0"/>
-              </a:rPr>
-              <a:t>Prenger, Sanjeev Satheesh, Shubho Sengupta, Adam Coates, Andrew Y</a:t>
-            </a:r>
-            <a:r>
-              <a:rPr lang="vi-VN" sz="2400" noProof="1">
-                <a:solidFill>
-                  <a:srgbClr val="002060"/>
-                </a:solidFill>
-                <a:latin typeface="Times New Roman" panose="02020603050405020304" pitchFamily="18" charset="0"/>
-                <a:cs typeface="Times New Roman" panose="02020603050405020304" pitchFamily="18" charset="0"/>
-              </a:rPr>
-              <a:t>. </a:t>
+              <a:t>Prenger, Sanjeev Satheesh, Shubho Sengupta, Adam Coates, Andrew Y. </a:t>
             </a:r>
             <a:r>
               <a:rPr lang="vi-VN" sz="2400" noProof="1" smtClean="0">
@@ -27841,17 +27775,7 @@
                 <a:latin typeface="Times New Roman" panose="02020603050405020304" pitchFamily="18" charset="0"/>
                 <a:cs typeface="Times New Roman" panose="02020603050405020304" pitchFamily="18" charset="0"/>
               </a:rPr>
-              <a:t>Deep Speech: Scaling </a:t>
-            </a:r>
-            <a:r>
-              <a:rPr lang="en-US" sz="2400" b="1" noProof="1">
-                <a:solidFill>
-                  <a:srgbClr val="002060"/>
-                </a:solidFill>
-                <a:latin typeface="Times New Roman" panose="02020603050405020304" pitchFamily="18" charset="0"/>
-                <a:cs typeface="Times New Roman" panose="02020603050405020304" pitchFamily="18" charset="0"/>
-              </a:rPr>
-              <a:t>up </a:t>
+              <a:t>Deep Speech: Scaling up </a:t>
             </a:r>
             <a:r>
               <a:rPr lang="en-US" sz="2400" b="1" noProof="1" smtClean="0">
@@ -27892,17 +27816,7 @@
                 <a:latin typeface="Times New Roman" panose="02020603050405020304" pitchFamily="18" charset="0"/>
                 <a:cs typeface="Times New Roman" panose="02020603050405020304" pitchFamily="18" charset="0"/>
               </a:rPr>
-              <a:t>Baidu Research – Silicon Valley </a:t>
-            </a:r>
-            <a:r>
-              <a:rPr lang="it-IT" sz="2400" noProof="1">
-                <a:solidFill>
-                  <a:srgbClr val="002060"/>
-                </a:solidFill>
-                <a:latin typeface="Times New Roman" panose="02020603050405020304" pitchFamily="18" charset="0"/>
-                <a:cs typeface="Times New Roman" panose="02020603050405020304" pitchFamily="18" charset="0"/>
-              </a:rPr>
-              <a:t>AI </a:t>
+              <a:t>Baidu Research – Silicon Valley AI </a:t>
             </a:r>
             <a:r>
               <a:rPr lang="it-IT" sz="2400" noProof="1" smtClean="0">
@@ -28032,17 +27946,7 @@
                 <a:latin typeface="Times New Roman" panose="02020603050405020304" pitchFamily="18" charset="0"/>
                 <a:cs typeface="Times New Roman" panose="02020603050405020304" pitchFamily="18" charset="0"/>
               </a:rPr>
-              <a:t>Machine Learning is Fun Part 6: How to do Speech Recognition with Deep </a:t>
-            </a:r>
-            <a:r>
-              <a:rPr lang="vi-VN" sz="2400" b="1" noProof="1">
-                <a:solidFill>
-                  <a:srgbClr val="002060"/>
-                </a:solidFill>
-                <a:latin typeface="Times New Roman" panose="02020603050405020304" pitchFamily="18" charset="0"/>
-                <a:cs typeface="Times New Roman" panose="02020603050405020304" pitchFamily="18" charset="0"/>
-              </a:rPr>
-              <a:t>Learning</a:t>
+              <a:t>Machine Learning is Fun Part 6: How to do Speech Recognition with Deep Learning</a:t>
             </a:r>
             <a:r>
               <a:rPr lang="vi-VN" sz="2400" noProof="1" smtClean="0">
@@ -28240,37 +28144,37 @@
                 <a:latin typeface="Times New Roman" panose="02020603050405020304" pitchFamily="18" charset="0"/>
                 <a:cs typeface="Times New Roman" panose="02020603050405020304" pitchFamily="18" charset="0"/>
               </a:rPr>
-              <a:t>Amodei, Rishita Anubhai, Eric Battenberg, Carl Case, Jared Casper, </a:t>
-            </a:r>
-            <a:r>
-              <a:rPr lang="en-US" sz="2400" noProof="1">
+              <a:t>Amodei, Rishita Anubhai, Eric Battenberg, Carl Case, Jared Casper, Bryan </a:t>
+            </a:r>
+            <a:r>
+              <a:rPr lang="en-US" sz="2400" noProof="1" smtClean="0">
                 <a:solidFill>
                   <a:srgbClr val="002060"/>
                 </a:solidFill>
                 <a:latin typeface="Times New Roman" panose="02020603050405020304" pitchFamily="18" charset="0"/>
                 <a:cs typeface="Times New Roman" panose="02020603050405020304" pitchFamily="18" charset="0"/>
               </a:rPr>
-              <a:t>Bryan </a:t>
-            </a:r>
-            <a:r>
-              <a:rPr lang="en-US" sz="2400" noProof="1" smtClean="0">
+              <a:t>Catanzaro, Jingdong </a:t>
+            </a:r>
+            <a:r>
+              <a:rPr lang="en-US" sz="2400" noProof="1">
                 <a:solidFill>
                   <a:srgbClr val="002060"/>
                 </a:solidFill>
                 <a:latin typeface="Times New Roman" panose="02020603050405020304" pitchFamily="18" charset="0"/>
                 <a:cs typeface="Times New Roman" panose="02020603050405020304" pitchFamily="18" charset="0"/>
               </a:rPr>
-              <a:t>Catanzaro, Jingdong </a:t>
-            </a:r>
-            <a:r>
-              <a:rPr lang="en-US" sz="2400" noProof="1">
+              <a:t>Chen, Mike Chrzanowski, Adam Coates, Greg Diamos, Erich Elsen, Jesse </a:t>
+            </a:r>
+            <a:r>
+              <a:rPr lang="en-US" sz="2400" noProof="1" smtClean="0">
                 <a:solidFill>
                   <a:srgbClr val="002060"/>
                 </a:solidFill>
                 <a:latin typeface="Times New Roman" panose="02020603050405020304" pitchFamily="18" charset="0"/>
                 <a:cs typeface="Times New Roman" panose="02020603050405020304" pitchFamily="18" charset="0"/>
               </a:rPr>
-              <a:t>Chen, Mike Chrzanowski, Adam Coates, Greg Diamos, Erich Elsen, </a:t>
+              <a:t>Engel, Linxi </a:t>
             </a:r>
             <a:r>
               <a:rPr lang="en-US" sz="2400" noProof="1">
@@ -28280,7 +28184,7 @@
                 <a:latin typeface="Times New Roman" panose="02020603050405020304" pitchFamily="18" charset="0"/>
                 <a:cs typeface="Times New Roman" panose="02020603050405020304" pitchFamily="18" charset="0"/>
               </a:rPr>
-              <a:t>Jesse </a:t>
+              <a:t>Fan, Christopher Fougner, Tony Han, Awni Hannun, Billy Jun, Patrick </a:t>
             </a:r>
             <a:r>
               <a:rPr lang="en-US" sz="2400" noProof="1" smtClean="0">
@@ -28290,7 +28194,7 @@
                 <a:latin typeface="Times New Roman" panose="02020603050405020304" pitchFamily="18" charset="0"/>
                 <a:cs typeface="Times New Roman" panose="02020603050405020304" pitchFamily="18" charset="0"/>
               </a:rPr>
-              <a:t>Engel, Linxi </a:t>
+              <a:t>LeGresley, Libby </a:t>
             </a:r>
             <a:r>
               <a:rPr lang="en-US" sz="2400" noProof="1">
@@ -28300,37 +28204,37 @@
                 <a:latin typeface="Times New Roman" panose="02020603050405020304" pitchFamily="18" charset="0"/>
                 <a:cs typeface="Times New Roman" panose="02020603050405020304" pitchFamily="18" charset="0"/>
               </a:rPr>
-              <a:t>Fan, Christopher Fougner, Tony Han, Awni Hannun, Billy Jun, </a:t>
-            </a:r>
-            <a:r>
-              <a:rPr lang="en-US" sz="2400" noProof="1">
+              <a:t>Lin, Sharan Narang, Andrew Ng, Sherjil Ozair, Ryan Prenger, Jonathan </a:t>
+            </a:r>
+            <a:r>
+              <a:rPr lang="en-US" sz="2400" noProof="1" smtClean="0">
                 <a:solidFill>
                   <a:srgbClr val="002060"/>
                 </a:solidFill>
                 <a:latin typeface="Times New Roman" panose="02020603050405020304" pitchFamily="18" charset="0"/>
                 <a:cs typeface="Times New Roman" panose="02020603050405020304" pitchFamily="18" charset="0"/>
               </a:rPr>
-              <a:t>Patrick </a:t>
-            </a:r>
-            <a:r>
-              <a:rPr lang="en-US" sz="2400" noProof="1" smtClean="0">
+              <a:t>Raiman, Sanjeev </a:t>
+            </a:r>
+            <a:r>
+              <a:rPr lang="en-US" sz="2400" noProof="1">
                 <a:solidFill>
                   <a:srgbClr val="002060"/>
                 </a:solidFill>
                 <a:latin typeface="Times New Roman" panose="02020603050405020304" pitchFamily="18" charset="0"/>
                 <a:cs typeface="Times New Roman" panose="02020603050405020304" pitchFamily="18" charset="0"/>
               </a:rPr>
-              <a:t>LeGresley, Libby </a:t>
-            </a:r>
-            <a:r>
-              <a:rPr lang="en-US" sz="2400" noProof="1">
+              <a:t>Satheesh, David Seetapun, Shubho Sengupta, Yi Wang, Zhiqian Wang, Chong </a:t>
+            </a:r>
+            <a:r>
+              <a:rPr lang="en-US" sz="2400" noProof="1" smtClean="0">
                 <a:solidFill>
                   <a:srgbClr val="002060"/>
                 </a:solidFill>
                 <a:latin typeface="Times New Roman" panose="02020603050405020304" pitchFamily="18" charset="0"/>
                 <a:cs typeface="Times New Roman" panose="02020603050405020304" pitchFamily="18" charset="0"/>
               </a:rPr>
-              <a:t>Lin, Sharan Narang, Andrew Ng, Sherjil Ozair, Ryan Prenger, </a:t>
+              <a:t>Wang, Bo </a:t>
             </a:r>
             <a:r>
               <a:rPr lang="en-US" sz="2400" noProof="1">
@@ -28340,7 +28244,7 @@
                 <a:latin typeface="Times New Roman" panose="02020603050405020304" pitchFamily="18" charset="0"/>
                 <a:cs typeface="Times New Roman" panose="02020603050405020304" pitchFamily="18" charset="0"/>
               </a:rPr>
-              <a:t>Jonathan </a:t>
+              <a:t>Xiao, Dani Yogatama, Jun Zhan, Zhenyao </a:t>
             </a:r>
             <a:r>
               <a:rPr lang="en-US" sz="2400" noProof="1" smtClean="0">
@@ -28350,147 +28254,67 @@
                 <a:latin typeface="Times New Roman" panose="02020603050405020304" pitchFamily="18" charset="0"/>
                 <a:cs typeface="Times New Roman" panose="02020603050405020304" pitchFamily="18" charset="0"/>
               </a:rPr>
-              <a:t>Raiman, Sanjeev </a:t>
-            </a:r>
-            <a:r>
-              <a:rPr lang="en-US" sz="2400" noProof="1">
+              <a:t>Zhu (2015). </a:t>
+            </a:r>
+            <a:r>
+              <a:rPr lang="en-US" sz="2400" b="1" noProof="1" smtClean="0">
                 <a:solidFill>
                   <a:srgbClr val="002060"/>
                 </a:solidFill>
                 <a:latin typeface="Times New Roman" panose="02020603050405020304" pitchFamily="18" charset="0"/>
                 <a:cs typeface="Times New Roman" panose="02020603050405020304" pitchFamily="18" charset="0"/>
               </a:rPr>
-              <a:t>Satheesh, David Seetapun, Shubho Sengupta, Yi Wang, Zhiqian Wang, </a:t>
-            </a:r>
-            <a:r>
-              <a:rPr lang="en-US" sz="2400" noProof="1">
+              <a:t>Deep </a:t>
+            </a:r>
+            <a:r>
+              <a:rPr lang="en-US" sz="2400" b="1" noProof="1">
                 <a:solidFill>
                   <a:srgbClr val="002060"/>
                 </a:solidFill>
                 <a:latin typeface="Times New Roman" panose="02020603050405020304" pitchFamily="18" charset="0"/>
                 <a:cs typeface="Times New Roman" panose="02020603050405020304" pitchFamily="18" charset="0"/>
               </a:rPr>
-              <a:t>Chong </a:t>
-            </a:r>
-            <a:r>
-              <a:rPr lang="en-US" sz="2400" noProof="1" smtClean="0">
+              <a:t>Speech 2: End-to-End Speech Recognition </a:t>
+            </a:r>
+            <a:r>
+              <a:rPr lang="en-US" sz="2400" b="1" noProof="1" smtClean="0">
                 <a:solidFill>
                   <a:srgbClr val="002060"/>
                 </a:solidFill>
                 <a:latin typeface="Times New Roman" panose="02020603050405020304" pitchFamily="18" charset="0"/>
                 <a:cs typeface="Times New Roman" panose="02020603050405020304" pitchFamily="18" charset="0"/>
               </a:rPr>
-              <a:t>Wang, Bo </a:t>
-            </a:r>
-            <a:r>
-              <a:rPr lang="en-US" sz="2400" noProof="1">
+              <a:t>in English </a:t>
+            </a:r>
+            <a:r>
+              <a:rPr lang="en-US" sz="2400" b="1" noProof="1">
                 <a:solidFill>
                   <a:srgbClr val="002060"/>
                 </a:solidFill>
                 <a:latin typeface="Times New Roman" panose="02020603050405020304" pitchFamily="18" charset="0"/>
                 <a:cs typeface="Times New Roman" panose="02020603050405020304" pitchFamily="18" charset="0"/>
               </a:rPr>
-              <a:t>Xiao, Dani Yogatama, Jun Zhan, </a:t>
-            </a:r>
-            <a:r>
-              <a:rPr lang="en-US" sz="2400" noProof="1">
+              <a:t>and </a:t>
+            </a:r>
+            <a:r>
+              <a:rPr lang="en-US" sz="2400" b="1" noProof="1" smtClean="0">
                 <a:solidFill>
                   <a:srgbClr val="002060"/>
                 </a:solidFill>
                 <a:latin typeface="Times New Roman" panose="02020603050405020304" pitchFamily="18" charset="0"/>
                 <a:cs typeface="Times New Roman" panose="02020603050405020304" pitchFamily="18" charset="0"/>
               </a:rPr>
-              <a:t>Zhenyao </a:t>
-            </a:r>
-            <a:r>
-              <a:rPr lang="en-US" sz="2400" noProof="1" smtClean="0">
+              <a:t>Mandarin. </a:t>
+            </a:r>
+            <a:r>
+              <a:rPr lang="it-IT" sz="2400" noProof="1">
                 <a:solidFill>
                   <a:srgbClr val="002060"/>
                 </a:solidFill>
                 <a:latin typeface="Times New Roman" panose="02020603050405020304" pitchFamily="18" charset="0"/>
                 <a:cs typeface="Times New Roman" panose="02020603050405020304" pitchFamily="18" charset="0"/>
               </a:rPr>
-              <a:t>Zhu (2015). </a:t>
-            </a:r>
-            <a:r>
-              <a:rPr lang="en-US" sz="2400" b="1" noProof="1" smtClean="0">
-                <a:solidFill>
-                  <a:srgbClr val="002060"/>
-                </a:solidFill>
-                <a:latin typeface="Times New Roman" panose="02020603050405020304" pitchFamily="18" charset="0"/>
-                <a:cs typeface="Times New Roman" panose="02020603050405020304" pitchFamily="18" charset="0"/>
-              </a:rPr>
-              <a:t>Deep </a:t>
-            </a:r>
-            <a:r>
-              <a:rPr lang="en-US" sz="2400" b="1" noProof="1">
-                <a:solidFill>
-                  <a:srgbClr val="002060"/>
-                </a:solidFill>
-                <a:latin typeface="Times New Roman" panose="02020603050405020304" pitchFamily="18" charset="0"/>
-                <a:cs typeface="Times New Roman" panose="02020603050405020304" pitchFamily="18" charset="0"/>
-              </a:rPr>
-              <a:t>Speech 2: End-to-End Speech </a:t>
-            </a:r>
-            <a:r>
-              <a:rPr lang="en-US" sz="2400" b="1" noProof="1">
-                <a:solidFill>
-                  <a:srgbClr val="002060"/>
-                </a:solidFill>
-                <a:latin typeface="Times New Roman" panose="02020603050405020304" pitchFamily="18" charset="0"/>
-                <a:cs typeface="Times New Roman" panose="02020603050405020304" pitchFamily="18" charset="0"/>
-              </a:rPr>
-              <a:t>Recognition </a:t>
-            </a:r>
-            <a:r>
-              <a:rPr lang="en-US" sz="2400" b="1" noProof="1" smtClean="0">
-                <a:solidFill>
-                  <a:srgbClr val="002060"/>
-                </a:solidFill>
-                <a:latin typeface="Times New Roman" panose="02020603050405020304" pitchFamily="18" charset="0"/>
-                <a:cs typeface="Times New Roman" panose="02020603050405020304" pitchFamily="18" charset="0"/>
-              </a:rPr>
-              <a:t>in English </a:t>
-            </a:r>
-            <a:r>
-              <a:rPr lang="en-US" sz="2400" b="1" noProof="1">
-                <a:solidFill>
-                  <a:srgbClr val="002060"/>
-                </a:solidFill>
-                <a:latin typeface="Times New Roman" panose="02020603050405020304" pitchFamily="18" charset="0"/>
-                <a:cs typeface="Times New Roman" panose="02020603050405020304" pitchFamily="18" charset="0"/>
-              </a:rPr>
-              <a:t>and </a:t>
-            </a:r>
-            <a:r>
-              <a:rPr lang="en-US" sz="2400" b="1" noProof="1" smtClean="0">
-                <a:solidFill>
-                  <a:srgbClr val="002060"/>
-                </a:solidFill>
-                <a:latin typeface="Times New Roman" panose="02020603050405020304" pitchFamily="18" charset="0"/>
-                <a:cs typeface="Times New Roman" panose="02020603050405020304" pitchFamily="18" charset="0"/>
-              </a:rPr>
-              <a:t>Mandarin. </a:t>
-            </a:r>
-            <a:r>
-              <a:rPr lang="it-IT" sz="2400" noProof="1">
-                <a:solidFill>
-                  <a:srgbClr val="002060"/>
-                </a:solidFill>
-                <a:latin typeface="Times New Roman" panose="02020603050405020304" pitchFamily="18" charset="0"/>
-                <a:cs typeface="Times New Roman" panose="02020603050405020304" pitchFamily="18" charset="0"/>
-              </a:rPr>
-              <a:t>Baidu Research – Silicon Valley </a:t>
-            </a:r>
-            <a:r>
-              <a:rPr lang="it-IT" sz="2400" noProof="1">
-                <a:solidFill>
-                  <a:srgbClr val="002060"/>
-                </a:solidFill>
-                <a:latin typeface="Times New Roman" panose="02020603050405020304" pitchFamily="18" charset="0"/>
-                <a:cs typeface="Times New Roman" panose="02020603050405020304" pitchFamily="18" charset="0"/>
-              </a:rPr>
-              <a:t>AI </a:t>
+              <a:t>Baidu Research – Silicon Valley AI </a:t>
             </a:r>
             <a:r>
               <a:rPr lang="it-IT" sz="2400" noProof="1" smtClean="0">
@@ -28674,7 +28498,7 @@
         <p:fade/>
       </p:transition>
     </mc:Choice>
-    <mc:Fallback xmlns:p15="http://schemas.microsoft.com/office/powerpoint/2012/main" xmlns="">
+    <mc:Fallback xmlns="" xmlns:p15="http://schemas.microsoft.com/office/powerpoint/2012/main">
       <p:transition spd="med">
         <p:fade/>
       </p:transition>
@@ -29108,7 +28932,7 @@
         <p:fade/>
       </p:transition>
     </mc:Choice>
-    <mc:Fallback xmlns:p15="http://schemas.microsoft.com/office/powerpoint/2012/main" xmlns="">
+    <mc:Fallback xmlns="" xmlns:p15="http://schemas.microsoft.com/office/powerpoint/2012/main">
       <p:transition spd="med">
         <p:fade/>
       </p:transition>
@@ -29595,7 +29419,7 @@
         <p:fade/>
       </p:transition>
     </mc:Choice>
-    <mc:Fallback xmlns:p15="http://schemas.microsoft.com/office/powerpoint/2012/main" xmlns="">
+    <mc:Fallback xmlns="" xmlns:p15="http://schemas.microsoft.com/office/powerpoint/2012/main">
       <p:transition spd="med">
         <p:fade/>
       </p:transition>
@@ -30005,7 +29829,7 @@
         <p:fade/>
       </p:transition>
     </mc:Choice>
-    <mc:Fallback xmlns:p15="http://schemas.microsoft.com/office/powerpoint/2012/main" xmlns="">
+    <mc:Fallback xmlns="" xmlns:p15="http://schemas.microsoft.com/office/powerpoint/2012/main">
       <p:transition spd="med">
         <p:fade/>
       </p:transition>
@@ -30683,7 +30507,7 @@
         <p:fade/>
       </p:transition>
     </mc:Choice>
-    <mc:Fallback xmlns:p15="http://schemas.microsoft.com/office/powerpoint/2012/main" xmlns="">
+    <mc:Fallback xmlns="" xmlns:p15="http://schemas.microsoft.com/office/powerpoint/2012/main">
       <p:transition spd="med">
         <p:fade/>
       </p:transition>
@@ -31197,7 +31021,7 @@
         <p:fade/>
       </p:transition>
     </mc:Choice>
-    <mc:Fallback xmlns:p15="http://schemas.microsoft.com/office/powerpoint/2012/main" xmlns="">
+    <mc:Fallback xmlns="" xmlns:p15="http://schemas.microsoft.com/office/powerpoint/2012/main">
       <p:transition spd="med">
         <p:fade/>
       </p:transition>
@@ -32359,7 +32183,25 @@
                 </a:solidFill>
                 <a:latin typeface="Times New Roman"/>
               </a:rPr>
-              <a:t>ơ sở dữ liệu tiếng nói cho đào tạo có đủ các mẫu cần nhận dạng </a:t>
+              <a:t>ơ sở dữ liệu </a:t>
+            </a:r>
+            <a:r>
+              <a:rPr lang="vi-VN" sz="2400" spc="-1" dirty="0" smtClean="0">
+                <a:solidFill>
+                  <a:srgbClr val="002060"/>
+                </a:solidFill>
+                <a:latin typeface="Times New Roman"/>
+              </a:rPr>
+              <a:t>tiếng </a:t>
+            </a:r>
+            <a:r>
+              <a:rPr lang="vi-VN" sz="2400" spc="-1" dirty="0">
+                <a:solidFill>
+                  <a:srgbClr val="002060"/>
+                </a:solidFill>
+                <a:latin typeface="Times New Roman"/>
+              </a:rPr>
+              <a:t>nói cho đào tạo có đủ các mẫu cần nhận dạng </a:t>
             </a:r>
             <a:r>
               <a:rPr lang="en-US" sz="2400" spc="-1" dirty="0">
@@ -32372,7 +32214,7 @@
               <a:t> </a:t>
             </a:r>
             <a:r>
-              <a:rPr lang="vi-VN" sz="2400" spc="-1" dirty="0">
+              <a:rPr lang="vi-VN" sz="2400" spc="-1" dirty="0" smtClean="0">
                 <a:solidFill>
                   <a:srgbClr val="002060"/>
                 </a:solidFill>
@@ -32381,7 +32223,7 @@
               <a:t>quá trình đào tạo có thể xác định chính xác các đặc tính âm</a:t>
             </a:r>
             <a:r>
-              <a:rPr lang="en-US" sz="2400" spc="-1" dirty="0">
+              <a:rPr lang="en-US" sz="2400" spc="-1" dirty="0" smtClean="0">
                 <a:solidFill>
                   <a:srgbClr val="002060"/>
                 </a:solidFill>
@@ -32390,7 +32232,7 @@
               <a:t> </a:t>
             </a:r>
             <a:r>
-              <a:rPr lang="vi-VN" sz="2400" spc="-1" dirty="0">
+              <a:rPr lang="vi-VN" sz="2400" spc="-1" dirty="0" smtClean="0">
                 <a:solidFill>
                   <a:srgbClr val="002060"/>
                 </a:solidFill>
@@ -32399,7 +32241,7 @@
               <a:t>học của mẫu</a:t>
             </a:r>
             <a:r>
-              <a:rPr lang="en-US" sz="2400" spc="-1" dirty="0">
+              <a:rPr lang="en-US" sz="2400" spc="-1" dirty="0" smtClean="0">
                 <a:solidFill>
                   <a:srgbClr val="002060"/>
                 </a:solidFill>
@@ -32514,7 +32356,7 @@
         <p:fade/>
       </p:transition>
     </mc:Choice>
-    <mc:Fallback xmlns:p15="http://schemas.microsoft.com/office/powerpoint/2012/main" xmlns="">
+    <mc:Fallback xmlns="" xmlns:p15="http://schemas.microsoft.com/office/powerpoint/2012/main">
       <p:transition spd="med">
         <p:fade/>
       </p:transition>

</xml_diff>